<commit_message>
added to Problems Encountered
</commit_message>
<xml_diff>
--- a/OpenGlCse386/Alien Pig invaders.pptx
+++ b/OpenGlCse386/Alien Pig invaders.pptx
@@ -110,6 +110,11 @@
       </a:defRPr>
     </a:lvl9pPr>
   </p:defaultTextStyle>
+  <p:extLst>
+    <p:ext uri="{EFAFB233-063F-42B5-8137-9DF3F51BA10A}">
+      <p15:sldGuideLst xmlns:p15="http://schemas.microsoft.com/office/powerpoint/2012/main"/>
+    </p:ext>
+  </p:extLst>
 </p:presentation>
 </file>
 
@@ -5946,6 +5951,10 @@
           <a:bodyPr/>
           <a:lstStyle/>
           <a:p>
+            <a:r>
+              <a:rPr lang="en-US" dirty="0" smtClean="0"/>
+              <a:t>GAME OVER</a:t>
+            </a:r>
             <a:endParaRPr lang="en-US" dirty="0"/>
           </a:p>
         </p:txBody>
@@ -6308,18 +6317,62 @@
         </p:nvSpPr>
         <p:spPr/>
         <p:txBody>
-          <a:bodyPr/>
+          <a:bodyPr>
+            <a:normAutofit fontScale="92500" lnSpcReduction="10000"/>
+          </a:bodyPr>
           <a:lstStyle/>
           <a:p>
             <a:r>
               <a:rPr lang="en-US" dirty="0" smtClean="0"/>
-              <a:t>Having multiple pigs made the pig sounds annoying to the user. We fixed this by using update() to only let the closest pig make noises. The rest of the pigs are silent.</a:t>
-            </a:r>
-          </a:p>
-          <a:p>
+              <a:t>Having multiple pigs made the pig sounds annoying to the user. We fixed this by using update() to only let the </a:t>
+            </a:r>
             <a:r>
               <a:rPr lang="en-US" dirty="0" smtClean="0"/>
-              <a:t>Wall collisions on the corners/edges of the wall were difficult as well. We had to be careful with our calculations in those scenarios.</a:t>
+              <a:t>pigs within proximity </a:t>
+            </a:r>
+            <a:r>
+              <a:rPr lang="en-US" dirty="0" smtClean="0"/>
+              <a:t>make noises. The rest of the pigs are silent.</a:t>
+            </a:r>
+          </a:p>
+          <a:p>
+            <a:r>
+              <a:rPr lang="en-US" dirty="0" smtClean="0"/>
+              <a:t>Wall collisions on the corners/edges of the wall were difficult as well. We had to be careful with our calculations in those scenarios</a:t>
+            </a:r>
+            <a:r>
+              <a:rPr lang="en-US" dirty="0" smtClean="0"/>
+              <a:t>. There were also two ways to calculate movement based on the view, so the collision calculation had to be generalized in order for it to work for both viewpoints.</a:t>
+            </a:r>
+          </a:p>
+          <a:p>
+            <a:r>
+              <a:rPr lang="en-US" dirty="0" smtClean="0"/>
+              <a:t>The sphere object had to be altered to make transparent (unfortunately you can’t tell it’s transparent…)</a:t>
+            </a:r>
+          </a:p>
+          <a:p>
+            <a:r>
+              <a:rPr lang="en-US" dirty="0" smtClean="0"/>
+              <a:t>A lot of trigonometry was required in order to make the tilt animation for the UFO and the view points work properly.</a:t>
+            </a:r>
+          </a:p>
+          <a:p>
+            <a:r>
+              <a:rPr lang="en-US" dirty="0" smtClean="0"/>
+              <a:t>Had to become familiar with the </a:t>
+            </a:r>
+            <a:r>
+              <a:rPr lang="en-US" dirty="0" err="1" smtClean="0"/>
+              <a:t>KeyboardUpFunc</a:t>
+            </a:r>
+            <a:r>
+              <a:rPr lang="en-US" dirty="0" smtClean="0"/>
+              <a:t> in order to implement better </a:t>
+            </a:r>
+            <a:r>
+              <a:rPr lang="en-US" smtClean="0"/>
+              <a:t>movement control.</a:t>
             </a:r>
             <a:endParaRPr lang="en-US" dirty="0"/>
           </a:p>

</xml_diff>